<commit_message>
Update Bangun Datar dan Bangun Ruang.pptx
</commit_message>
<xml_diff>
--- a/training_code_id/hari2/Bangun Datar dan Bangun Ruang.pptx
+++ b/training_code_id/hari2/Bangun Datar dan Bangun Ruang.pptx
@@ -22,6 +22,12 @@
     <p:sldId id="273" r:id="rId16"/>
     <p:sldId id="274" r:id="rId17"/>
     <p:sldId id="275" r:id="rId18"/>
+    <p:sldId id="276" r:id="rId19"/>
+    <p:sldId id="277" r:id="rId20"/>
+    <p:sldId id="278" r:id="rId21"/>
+    <p:sldId id="279" r:id="rId22"/>
+    <p:sldId id="280" r:id="rId23"/>
+    <p:sldId id="281" r:id="rId24"/>
   </p:sldIdLst>
   <p:sldSz cx="12192000" cy="6858000"/>
   <p:notesSz cx="6858000" cy="9144000"/>
@@ -120,6 +126,11 @@
       </a:defRPr>
     </a:lvl9pPr>
   </p:defaultTextStyle>
+  <p:extLst>
+    <p:ext uri="{EFAFB233-063F-42B5-8137-9DF3F51BA10A}">
+      <p15:sldGuideLst xmlns:p15="http://schemas.microsoft.com/office/powerpoint/2012/main"/>
+    </p:ext>
+  </p:extLst>
 </p:presentation>
 </file>
 
@@ -351,7 +362,7 @@
           <a:p>
             <a:fld id="{5A069CB8-F204-4D06-B913-C5A26A89888A}" type="datetimeFigureOut">
               <a:rPr lang="en-US" dirty="0"/>
-              <a:t>3/4/2020</a:t>
+              <a:t>3/5/2020</a:t>
             </a:fld>
             <a:endParaRPr lang="en-US" dirty="0"/>
           </a:p>
@@ -554,7 +565,7 @@
           <a:p>
             <a:fld id="{50B6E300-0A13-4A81-945A-7333C271A069}" type="datetimeFigureOut">
               <a:rPr lang="en-US" dirty="0"/>
-              <a:t>3/4/2020</a:t>
+              <a:t>3/5/2020</a:t>
             </a:fld>
             <a:endParaRPr lang="en-US" dirty="0"/>
           </a:p>
@@ -807,7 +818,7 @@
           <a:p>
             <a:fld id="{34671962-1EA4-46E7-BCB0-F36CE46D1A59}" type="datetimeFigureOut">
               <a:rPr lang="en-US" dirty="0"/>
-              <a:t>3/4/2020</a:t>
+              <a:t>3/5/2020</a:t>
             </a:fld>
             <a:endParaRPr lang="en-US" dirty="0"/>
           </a:p>
@@ -972,7 +983,7 @@
           <a:p>
             <a:fld id="{D30BB376-B19C-488D-ABEB-03C7E6E9E3E0}" type="datetimeFigureOut">
               <a:rPr lang="en-US" dirty="0"/>
-              <a:t>3/4/2020</a:t>
+              <a:t>3/5/2020</a:t>
             </a:fld>
             <a:endParaRPr lang="en-US" dirty="0"/>
           </a:p>
@@ -1304,7 +1315,7 @@
           <a:p>
             <a:fld id="{486F077B-A50F-4D64-8574-E2D6A98A5553}" type="datetimeFigureOut">
               <a:rPr lang="en-US" dirty="0"/>
-              <a:t>3/4/2020</a:t>
+              <a:t>3/5/2020</a:t>
             </a:fld>
             <a:endParaRPr lang="en-US" dirty="0"/>
           </a:p>
@@ -1574,7 +1585,7 @@
           <a:p>
             <a:fld id="{7D9E2A62-1983-43A1-A163-D8AA46534C80}" type="datetimeFigureOut">
               <a:rPr lang="en-US" dirty="0"/>
-              <a:t>3/4/2020</a:t>
+              <a:t>3/5/2020</a:t>
             </a:fld>
             <a:endParaRPr lang="en-US" dirty="0"/>
           </a:p>
@@ -1948,7 +1959,7 @@
           <a:p>
             <a:fld id="{898F3E3B-34E3-4345-B2A1-994B83598A9C}" type="datetimeFigureOut">
               <a:rPr lang="en-US" dirty="0"/>
-              <a:t>3/4/2020</a:t>
+              <a:t>3/5/2020</a:t>
             </a:fld>
             <a:endParaRPr lang="en-US" dirty="0"/>
           </a:p>
@@ -2061,7 +2072,7 @@
           <a:p>
             <a:fld id="{FD816C96-82A1-4D77-8ADA-627AC6FE3D65}" type="datetimeFigureOut">
               <a:rPr lang="en-US" dirty="0"/>
-              <a:t>3/4/2020</a:t>
+              <a:t>3/5/2020</a:t>
             </a:fld>
             <a:endParaRPr lang="en-US" dirty="0"/>
           </a:p>
@@ -2229,7 +2240,7 @@
           <a:p>
             <a:fld id="{1D102C1E-28F2-47E9-802D-339E64E2F920}" type="datetimeFigureOut">
               <a:rPr lang="en-US" dirty="0"/>
-              <a:t>3/4/2020</a:t>
+              <a:t>3/5/2020</a:t>
             </a:fld>
             <a:endParaRPr lang="en-US" dirty="0"/>
           </a:p>
@@ -2581,7 +2592,7 @@
           <a:p>
             <a:fld id="{24271A48-F18A-45B3-BC05-1E27DA3F88AF}" type="datetimeFigureOut">
               <a:rPr lang="en-US" dirty="0"/>
-              <a:t>3/4/2020</a:t>
+              <a:t>3/5/2020</a:t>
             </a:fld>
             <a:endParaRPr lang="en-US" dirty="0"/>
           </a:p>
@@ -2956,7 +2967,7 @@
           <a:p>
             <a:fld id="{65B747F8-9654-4282-85D2-65F41AAE7A75}" type="datetimeFigureOut">
               <a:rPr lang="en-US" dirty="0"/>
-              <a:t>3/4/2020</a:t>
+              <a:t>3/5/2020</a:t>
             </a:fld>
             <a:endParaRPr lang="en-US" dirty="0"/>
           </a:p>
@@ -3240,7 +3251,7 @@
           <a:p>
             <a:fld id="{5DC5B261-8843-42D1-AAFC-05E20E2D9B97}" type="datetimeFigureOut">
               <a:rPr lang="en-US" dirty="0"/>
-              <a:t>3/4/2020</a:t>
+              <a:t>3/5/2020</a:t>
             </a:fld>
             <a:endParaRPr lang="en-US" dirty="0"/>
           </a:p>
@@ -3912,20 +3923,54 @@
       </p:sp>
       <p:sp>
         <p:nvSpPr>
-          <p:cNvPr id="3" name="Content Placeholder 2"/>
-          <p:cNvSpPr>
-            <a:spLocks noGrp="1"/>
-          </p:cNvSpPr>
-          <p:nvPr>
-            <p:ph idx="1"/>
-          </p:nvPr>
-        </p:nvSpPr>
-        <p:spPr/>
-        <p:txBody>
-          <a:bodyPr/>
+          <p:cNvPr id="4" name="TextBox 3"/>
+          <p:cNvSpPr txBox="1"/>
+          <p:nvPr/>
+        </p:nvSpPr>
+        <p:spPr>
+          <a:xfrm>
+            <a:off x="2993315" y="1909482"/>
+            <a:ext cx="6266329" cy="2308324"/>
+          </a:xfrm>
+          <a:prstGeom prst="rect">
+            <a:avLst/>
+          </a:prstGeom>
+          <a:noFill/>
+        </p:spPr>
+        <p:txBody>
+          <a:bodyPr wrap="square" rtlCol="0">
+            <a:spAutoFit/>
+          </a:bodyPr>
           <a:lstStyle/>
           <a:p>
-            <a:endParaRPr lang="en-US"/>
+            <a:r>
+              <a:rPr lang="en-US" dirty="0"/>
+              <a:t>In Java, it is possible to inherit attributes and methods from one class to another. We group the "inheritance concept" into two categories:</a:t>
+            </a:r>
+          </a:p>
+          <a:p>
+            <a:endParaRPr lang="en-US" dirty="0"/>
+          </a:p>
+          <a:p>
+            <a:r>
+              <a:rPr lang="en-US" dirty="0"/>
+              <a:t>    subclass (child) - the class that inherits from another class</a:t>
+            </a:r>
+          </a:p>
+          <a:p>
+            <a:r>
+              <a:rPr lang="en-US" dirty="0"/>
+              <a:t>    superclass (parent) - the class being inherited from</a:t>
+            </a:r>
+          </a:p>
+          <a:p>
+            <a:endParaRPr lang="en-US" dirty="0"/>
+          </a:p>
+          <a:p>
+            <a:r>
+              <a:rPr lang="en-US" dirty="0"/>
+              <a:t>To inherit from a class, use the extends keyword.</a:t>
+            </a:r>
           </a:p>
         </p:txBody>
       </p:sp>
@@ -5081,6 +5126,57 @@
           </a:p>
         </p:txBody>
       </p:sp>
+      <p:sp>
+        <p:nvSpPr>
+          <p:cNvPr id="3" name="TextBox 2"/>
+          <p:cNvSpPr txBox="1"/>
+          <p:nvPr/>
+        </p:nvSpPr>
+        <p:spPr>
+          <a:xfrm>
+            <a:off x="3307976" y="2124635"/>
+            <a:ext cx="5903259" cy="923330"/>
+          </a:xfrm>
+          <a:prstGeom prst="rect">
+            <a:avLst/>
+          </a:prstGeom>
+          <a:noFill/>
+        </p:spPr>
+        <p:txBody>
+          <a:bodyPr wrap="square" rtlCol="0">
+            <a:spAutoFit/>
+          </a:bodyPr>
+          <a:lstStyle/>
+          <a:p>
+            <a:pPr algn="ctr"/>
+            <a:r>
+              <a:rPr lang="en-US" b="1" i="1" dirty="0"/>
+              <a:t>Java Abstract</a:t>
+            </a:r>
+            <a:r>
+              <a:rPr lang="en-US" b="1" dirty="0"/>
+              <a:t> </a:t>
+            </a:r>
+            <a:r>
+              <a:rPr lang="en-US" dirty="0"/>
+              <a:t>Classes and Methods. Data </a:t>
+            </a:r>
+            <a:r>
+              <a:rPr lang="en-US" i="1" dirty="0"/>
+              <a:t>abstraction</a:t>
+            </a:r>
+            <a:r>
+              <a:rPr lang="en-US" dirty="0"/>
+              <a:t> is the process of hiding certain details and showing only essential information to the </a:t>
+            </a:r>
+            <a:r>
+              <a:rPr lang="en-US" dirty="0" smtClean="0"/>
+              <a:t>user.</a:t>
+            </a:r>
+            <a:endParaRPr lang="en-US" dirty="0"/>
+          </a:p>
+        </p:txBody>
+      </p:sp>
     </p:spTree>
     <p:extLst>
       <p:ext uri="{BB962C8B-B14F-4D97-AF65-F5344CB8AC3E}">
@@ -5394,6 +5490,280 @@
 </p:sld>
 </file>
 
+<file path=ppt/slides/slide18.xml><?xml version="1.0" encoding="utf-8"?>
+<p:sld xmlns:a="http://schemas.openxmlformats.org/drawingml/2006/main" xmlns:r="http://schemas.openxmlformats.org/officeDocument/2006/relationships" xmlns:p="http://schemas.openxmlformats.org/presentationml/2006/main">
+  <p:cSld>
+    <p:spTree>
+      <p:nvGrpSpPr>
+        <p:cNvPr id="1" name=""/>
+        <p:cNvGrpSpPr/>
+        <p:nvPr/>
+      </p:nvGrpSpPr>
+      <p:grpSpPr>
+        <a:xfrm>
+          <a:off x="0" y="0"/>
+          <a:ext cx="0" cy="0"/>
+          <a:chOff x="0" y="0"/>
+          <a:chExt cx="0" cy="0"/>
+        </a:xfrm>
+      </p:grpSpPr>
+      <p:sp>
+        <p:nvSpPr>
+          <p:cNvPr id="2" name="Title 1"/>
+          <p:cNvSpPr>
+            <a:spLocks noGrp="1"/>
+          </p:cNvSpPr>
+          <p:nvPr>
+            <p:ph type="ctrTitle"/>
+          </p:nvPr>
+        </p:nvSpPr>
+        <p:spPr/>
+        <p:txBody>
+          <a:bodyPr/>
+          <a:lstStyle/>
+          <a:p>
+            <a:pPr algn="ctr"/>
+            <a:r>
+              <a:rPr lang="en-US" dirty="0" smtClean="0"/>
+              <a:t>Encapsulation</a:t>
+            </a:r>
+            <a:endParaRPr lang="en-US" dirty="0"/>
+          </a:p>
+        </p:txBody>
+      </p:sp>
+      <p:sp>
+        <p:nvSpPr>
+          <p:cNvPr id="4" name="TextBox 3"/>
+          <p:cNvSpPr txBox="1"/>
+          <p:nvPr/>
+        </p:nvSpPr>
+        <p:spPr>
+          <a:xfrm>
+            <a:off x="2651087" y="4437530"/>
+            <a:ext cx="6950785" cy="1200329"/>
+          </a:xfrm>
+          <a:prstGeom prst="rect">
+            <a:avLst/>
+          </a:prstGeom>
+          <a:noFill/>
+        </p:spPr>
+        <p:txBody>
+          <a:bodyPr wrap="square" rtlCol="0">
+            <a:spAutoFit/>
+          </a:bodyPr>
+          <a:lstStyle/>
+          <a:p>
+            <a:pPr algn="ctr"/>
+            <a:r>
+              <a:rPr lang="en-US" dirty="0"/>
+              <a:t>This </a:t>
+            </a:r>
+            <a:r>
+              <a:rPr lang="en-US" dirty="0" smtClean="0"/>
+              <a:t>encapsulation </a:t>
+            </a:r>
+            <a:r>
+              <a:rPr lang="en-US" dirty="0"/>
+              <a:t>concept protects a program from accessing other programs that affect it, the benefit is maintaining the integrity of the program that has been made with the concepts and plans that have been determined from the start</a:t>
+            </a:r>
+          </a:p>
+        </p:txBody>
+      </p:sp>
+    </p:spTree>
+    <p:extLst>
+      <p:ext uri="{BB962C8B-B14F-4D97-AF65-F5344CB8AC3E}">
+        <p14:creationId xmlns:p14="http://schemas.microsoft.com/office/powerpoint/2010/main" val="3177164542"/>
+      </p:ext>
+    </p:extLst>
+  </p:cSld>
+  <p:clrMapOvr>
+    <a:masterClrMapping/>
+  </p:clrMapOvr>
+</p:sld>
+</file>
+
+<file path=ppt/slides/slide19.xml><?xml version="1.0" encoding="utf-8"?>
+<p:sld xmlns:a="http://schemas.openxmlformats.org/drawingml/2006/main" xmlns:r="http://schemas.openxmlformats.org/officeDocument/2006/relationships" xmlns:p="http://schemas.openxmlformats.org/presentationml/2006/main">
+  <p:cSld>
+    <p:spTree>
+      <p:nvGrpSpPr>
+        <p:cNvPr id="1" name=""/>
+        <p:cNvGrpSpPr/>
+        <p:nvPr/>
+      </p:nvGrpSpPr>
+      <p:grpSpPr>
+        <a:xfrm>
+          <a:off x="0" y="0"/>
+          <a:ext cx="0" cy="0"/>
+          <a:chOff x="0" y="0"/>
+          <a:chExt cx="0" cy="0"/>
+        </a:xfrm>
+      </p:grpSpPr>
+      <p:pic>
+        <p:nvPicPr>
+          <p:cNvPr id="2" name="Picture 1"/>
+          <p:cNvPicPr>
+            <a:picLocks noChangeAspect="1"/>
+          </p:cNvPicPr>
+          <p:nvPr/>
+        </p:nvPicPr>
+        <p:blipFill>
+          <a:blip r:embed="rId2"/>
+          <a:stretch>
+            <a:fillRect/>
+          </a:stretch>
+        </p:blipFill>
+        <p:spPr>
+          <a:xfrm>
+            <a:off x="172291" y="242046"/>
+            <a:ext cx="3819525" cy="3657600"/>
+          </a:xfrm>
+          <a:prstGeom prst="rect">
+            <a:avLst/>
+          </a:prstGeom>
+        </p:spPr>
+      </p:pic>
+      <p:sp>
+        <p:nvSpPr>
+          <p:cNvPr id="3" name="Right Arrow 2"/>
+          <p:cNvSpPr/>
+          <p:nvPr/>
+        </p:nvSpPr>
+        <p:spPr>
+          <a:xfrm>
+            <a:off x="4139734" y="2225486"/>
+            <a:ext cx="526396" cy="215153"/>
+          </a:xfrm>
+          <a:prstGeom prst="rightArrow">
+            <a:avLst/>
+          </a:prstGeom>
+        </p:spPr>
+        <p:style>
+          <a:lnRef idx="2">
+            <a:schemeClr val="accent1">
+              <a:shade val="50000"/>
+            </a:schemeClr>
+          </a:lnRef>
+          <a:fillRef idx="1">
+            <a:schemeClr val="accent1"/>
+          </a:fillRef>
+          <a:effectRef idx="0">
+            <a:schemeClr val="accent1"/>
+          </a:effectRef>
+          <a:fontRef idx="minor">
+            <a:schemeClr val="lt1"/>
+          </a:fontRef>
+        </p:style>
+        <p:txBody>
+          <a:bodyPr rtlCol="0" anchor="ctr"/>
+          <a:lstStyle/>
+          <a:p>
+            <a:pPr algn="ctr"/>
+            <a:endParaRPr lang="en-US"/>
+          </a:p>
+        </p:txBody>
+      </p:sp>
+      <p:pic>
+        <p:nvPicPr>
+          <p:cNvPr id="4" name="Picture 3"/>
+          <p:cNvPicPr>
+            <a:picLocks noChangeAspect="1"/>
+          </p:cNvPicPr>
+          <p:nvPr/>
+        </p:nvPicPr>
+        <p:blipFill>
+          <a:blip r:embed="rId3"/>
+          <a:stretch>
+            <a:fillRect/>
+          </a:stretch>
+        </p:blipFill>
+        <p:spPr>
+          <a:xfrm>
+            <a:off x="4814048" y="242046"/>
+            <a:ext cx="7143750" cy="4343400"/>
+          </a:xfrm>
+          <a:prstGeom prst="rect">
+            <a:avLst/>
+          </a:prstGeom>
+        </p:spPr>
+      </p:pic>
+      <p:pic>
+        <p:nvPicPr>
+          <p:cNvPr id="5" name="Picture 4"/>
+          <p:cNvPicPr>
+            <a:picLocks noChangeAspect="1"/>
+          </p:cNvPicPr>
+          <p:nvPr/>
+        </p:nvPicPr>
+        <p:blipFill>
+          <a:blip r:embed="rId4"/>
+          <a:stretch>
+            <a:fillRect/>
+          </a:stretch>
+        </p:blipFill>
+        <p:spPr>
+          <a:xfrm>
+            <a:off x="6482881" y="5090551"/>
+            <a:ext cx="4187652" cy="1229566"/>
+          </a:xfrm>
+          <a:prstGeom prst="rect">
+            <a:avLst/>
+          </a:prstGeom>
+        </p:spPr>
+      </p:pic>
+      <p:sp>
+        <p:nvSpPr>
+          <p:cNvPr id="6" name="Down Arrow 5"/>
+          <p:cNvSpPr/>
+          <p:nvPr/>
+        </p:nvSpPr>
+        <p:spPr>
+          <a:xfrm>
+            <a:off x="8148918" y="4585446"/>
+            <a:ext cx="237005" cy="443754"/>
+          </a:xfrm>
+          <a:prstGeom prst="downArrow">
+            <a:avLst/>
+          </a:prstGeom>
+        </p:spPr>
+        <p:style>
+          <a:lnRef idx="2">
+            <a:schemeClr val="accent1">
+              <a:shade val="50000"/>
+            </a:schemeClr>
+          </a:lnRef>
+          <a:fillRef idx="1">
+            <a:schemeClr val="accent1"/>
+          </a:fillRef>
+          <a:effectRef idx="0">
+            <a:schemeClr val="accent1"/>
+          </a:effectRef>
+          <a:fontRef idx="minor">
+            <a:schemeClr val="lt1"/>
+          </a:fontRef>
+        </p:style>
+        <p:txBody>
+          <a:bodyPr rtlCol="0" anchor="ctr"/>
+          <a:lstStyle/>
+          <a:p>
+            <a:pPr algn="ctr"/>
+            <a:endParaRPr lang="en-US"/>
+          </a:p>
+        </p:txBody>
+      </p:sp>
+    </p:spTree>
+    <p:extLst>
+      <p:ext uri="{BB962C8B-B14F-4D97-AF65-F5344CB8AC3E}">
+        <p14:creationId xmlns:p14="http://schemas.microsoft.com/office/powerpoint/2010/main" val="582293492"/>
+      </p:ext>
+    </p:extLst>
+  </p:cSld>
+  <p:clrMapOvr>
+    <a:masterClrMapping/>
+  </p:clrMapOvr>
+</p:sld>
+</file>
+
 <file path=ppt/slides/slide2.xml><?xml version="1.0" encoding="utf-8"?>
 <p:sld xmlns:a="http://schemas.openxmlformats.org/drawingml/2006/main" xmlns:r="http://schemas.openxmlformats.org/officeDocument/2006/relationships" xmlns:p="http://schemas.openxmlformats.org/presentationml/2006/main">
   <p:cSld>
@@ -5465,6 +5835,618 @@
     <p:extLst>
       <p:ext uri="{BB962C8B-B14F-4D97-AF65-F5344CB8AC3E}">
         <p14:creationId xmlns:p14="http://schemas.microsoft.com/office/powerpoint/2010/main" val="3651578874"/>
+      </p:ext>
+    </p:extLst>
+  </p:cSld>
+  <p:clrMapOvr>
+    <a:masterClrMapping/>
+  </p:clrMapOvr>
+</p:sld>
+</file>
+
+<file path=ppt/slides/slide20.xml><?xml version="1.0" encoding="utf-8"?>
+<p:sld xmlns:a="http://schemas.openxmlformats.org/drawingml/2006/main" xmlns:r="http://schemas.openxmlformats.org/officeDocument/2006/relationships" xmlns:p="http://schemas.openxmlformats.org/presentationml/2006/main">
+  <p:cSld>
+    <p:spTree>
+      <p:nvGrpSpPr>
+        <p:cNvPr id="1" name=""/>
+        <p:cNvGrpSpPr/>
+        <p:nvPr/>
+      </p:nvGrpSpPr>
+      <p:grpSpPr>
+        <a:xfrm>
+          <a:off x="0" y="0"/>
+          <a:ext cx="0" cy="0"/>
+          <a:chOff x="0" y="0"/>
+          <a:chExt cx="0" cy="0"/>
+        </a:xfrm>
+      </p:grpSpPr>
+      <p:pic>
+        <p:nvPicPr>
+          <p:cNvPr id="2" name="Picture 1"/>
+          <p:cNvPicPr>
+            <a:picLocks noChangeAspect="1"/>
+          </p:cNvPicPr>
+          <p:nvPr/>
+        </p:nvPicPr>
+        <p:blipFill>
+          <a:blip r:embed="rId2"/>
+          <a:stretch>
+            <a:fillRect/>
+          </a:stretch>
+        </p:blipFill>
+        <p:spPr>
+          <a:xfrm>
+            <a:off x="127186" y="953901"/>
+            <a:ext cx="4446739" cy="2846854"/>
+          </a:xfrm>
+          <a:prstGeom prst="rect">
+            <a:avLst/>
+          </a:prstGeom>
+        </p:spPr>
+      </p:pic>
+      <p:pic>
+        <p:nvPicPr>
+          <p:cNvPr id="3" name="Picture 2"/>
+          <p:cNvPicPr>
+            <a:picLocks noChangeAspect="1"/>
+          </p:cNvPicPr>
+          <p:nvPr/>
+        </p:nvPicPr>
+        <p:blipFill>
+          <a:blip r:embed="rId3"/>
+          <a:stretch>
+            <a:fillRect/>
+          </a:stretch>
+        </p:blipFill>
+        <p:spPr>
+          <a:xfrm>
+            <a:off x="4867837" y="205628"/>
+            <a:ext cx="7143750" cy="4343400"/>
+          </a:xfrm>
+          <a:prstGeom prst="rect">
+            <a:avLst/>
+          </a:prstGeom>
+        </p:spPr>
+      </p:pic>
+      <p:sp>
+        <p:nvSpPr>
+          <p:cNvPr id="4" name="Right Arrow 3"/>
+          <p:cNvSpPr/>
+          <p:nvPr/>
+        </p:nvSpPr>
+        <p:spPr>
+          <a:xfrm>
+            <a:off x="4573925" y="2377328"/>
+            <a:ext cx="226675" cy="137272"/>
+          </a:xfrm>
+          <a:prstGeom prst="rightArrow">
+            <a:avLst/>
+          </a:prstGeom>
+        </p:spPr>
+        <p:style>
+          <a:lnRef idx="2">
+            <a:schemeClr val="accent1">
+              <a:shade val="50000"/>
+            </a:schemeClr>
+          </a:lnRef>
+          <a:fillRef idx="1">
+            <a:schemeClr val="accent1"/>
+          </a:fillRef>
+          <a:effectRef idx="0">
+            <a:schemeClr val="accent1"/>
+          </a:effectRef>
+          <a:fontRef idx="minor">
+            <a:schemeClr val="lt1"/>
+          </a:fontRef>
+        </p:style>
+        <p:txBody>
+          <a:bodyPr rtlCol="0" anchor="ctr"/>
+          <a:lstStyle/>
+          <a:p>
+            <a:pPr algn="ctr"/>
+            <a:endParaRPr lang="en-US"/>
+          </a:p>
+        </p:txBody>
+      </p:sp>
+      <p:pic>
+        <p:nvPicPr>
+          <p:cNvPr id="5" name="Picture 4"/>
+          <p:cNvPicPr>
+            <a:picLocks noChangeAspect="1"/>
+          </p:cNvPicPr>
+          <p:nvPr/>
+        </p:nvPicPr>
+        <p:blipFill>
+          <a:blip r:embed="rId4"/>
+          <a:stretch>
+            <a:fillRect/>
+          </a:stretch>
+        </p:blipFill>
+        <p:spPr>
+          <a:xfrm>
+            <a:off x="6982387" y="5041246"/>
+            <a:ext cx="2914650" cy="1266825"/>
+          </a:xfrm>
+          <a:prstGeom prst="rect">
+            <a:avLst/>
+          </a:prstGeom>
+        </p:spPr>
+      </p:pic>
+      <p:sp>
+        <p:nvSpPr>
+          <p:cNvPr id="6" name="Down Arrow 5"/>
+          <p:cNvSpPr/>
+          <p:nvPr/>
+        </p:nvSpPr>
+        <p:spPr>
+          <a:xfrm>
+            <a:off x="8229600" y="4666129"/>
+            <a:ext cx="210112" cy="309283"/>
+          </a:xfrm>
+          <a:prstGeom prst="downArrow">
+            <a:avLst/>
+          </a:prstGeom>
+        </p:spPr>
+        <p:style>
+          <a:lnRef idx="2">
+            <a:schemeClr val="accent1">
+              <a:shade val="50000"/>
+            </a:schemeClr>
+          </a:lnRef>
+          <a:fillRef idx="1">
+            <a:schemeClr val="accent1"/>
+          </a:fillRef>
+          <a:effectRef idx="0">
+            <a:schemeClr val="accent1"/>
+          </a:effectRef>
+          <a:fontRef idx="minor">
+            <a:schemeClr val="lt1"/>
+          </a:fontRef>
+        </p:style>
+        <p:txBody>
+          <a:bodyPr rtlCol="0" anchor="ctr"/>
+          <a:lstStyle/>
+          <a:p>
+            <a:pPr algn="ctr"/>
+            <a:endParaRPr lang="en-US"/>
+          </a:p>
+        </p:txBody>
+      </p:sp>
+    </p:spTree>
+    <p:extLst>
+      <p:ext uri="{BB962C8B-B14F-4D97-AF65-F5344CB8AC3E}">
+        <p14:creationId xmlns:p14="http://schemas.microsoft.com/office/powerpoint/2010/main" val="105784060"/>
+      </p:ext>
+    </p:extLst>
+  </p:cSld>
+  <p:clrMapOvr>
+    <a:masterClrMapping/>
+  </p:clrMapOvr>
+</p:sld>
+</file>
+
+<file path=ppt/slides/slide21.xml><?xml version="1.0" encoding="utf-8"?>
+<p:sld xmlns:a="http://schemas.openxmlformats.org/drawingml/2006/main" xmlns:r="http://schemas.openxmlformats.org/officeDocument/2006/relationships" xmlns:p="http://schemas.openxmlformats.org/presentationml/2006/main">
+  <p:cSld>
+    <p:spTree>
+      <p:nvGrpSpPr>
+        <p:cNvPr id="1" name=""/>
+        <p:cNvGrpSpPr/>
+        <p:nvPr/>
+      </p:nvGrpSpPr>
+      <p:grpSpPr>
+        <a:xfrm>
+          <a:off x="0" y="0"/>
+          <a:ext cx="0" cy="0"/>
+          <a:chOff x="0" y="0"/>
+          <a:chExt cx="0" cy="0"/>
+        </a:xfrm>
+      </p:grpSpPr>
+      <p:sp>
+        <p:nvSpPr>
+          <p:cNvPr id="2" name="Title 1"/>
+          <p:cNvSpPr>
+            <a:spLocks noGrp="1"/>
+          </p:cNvSpPr>
+          <p:nvPr>
+            <p:ph type="ctrTitle"/>
+          </p:nvPr>
+        </p:nvSpPr>
+        <p:spPr/>
+        <p:txBody>
+          <a:bodyPr/>
+          <a:lstStyle/>
+          <a:p>
+            <a:pPr algn="ctr"/>
+            <a:r>
+              <a:rPr lang="en-US" dirty="0" smtClean="0"/>
+              <a:t>Polymorphism</a:t>
+            </a:r>
+            <a:endParaRPr lang="en-US" dirty="0"/>
+          </a:p>
+        </p:txBody>
+      </p:sp>
+      <p:sp>
+        <p:nvSpPr>
+          <p:cNvPr id="4" name="TextBox 3"/>
+          <p:cNvSpPr txBox="1"/>
+          <p:nvPr/>
+        </p:nvSpPr>
+        <p:spPr>
+          <a:xfrm>
+            <a:off x="3281082" y="4585447"/>
+            <a:ext cx="5728447" cy="1210235"/>
+          </a:xfrm>
+          <a:prstGeom prst="rect">
+            <a:avLst/>
+          </a:prstGeom>
+          <a:noFill/>
+        </p:spPr>
+        <p:txBody>
+          <a:bodyPr wrap="square" rtlCol="0">
+            <a:spAutoFit/>
+          </a:bodyPr>
+          <a:lstStyle/>
+          <a:p>
+            <a:pPr algn="ctr"/>
+            <a:r>
+              <a:rPr lang="en-US" dirty="0"/>
+              <a:t>Polymorphism means "many forms", and it occurs when we have many classes that are related to each other by inheritance.</a:t>
+            </a:r>
+          </a:p>
+          <a:p>
+            <a:endParaRPr lang="en-US" dirty="0"/>
+          </a:p>
+        </p:txBody>
+      </p:sp>
+    </p:spTree>
+    <p:extLst>
+      <p:ext uri="{BB962C8B-B14F-4D97-AF65-F5344CB8AC3E}">
+        <p14:creationId xmlns:p14="http://schemas.microsoft.com/office/powerpoint/2010/main" val="2570361660"/>
+      </p:ext>
+    </p:extLst>
+  </p:cSld>
+  <p:clrMapOvr>
+    <a:masterClrMapping/>
+  </p:clrMapOvr>
+</p:sld>
+</file>
+
+<file path=ppt/slides/slide22.xml><?xml version="1.0" encoding="utf-8"?>
+<p:sld xmlns:a="http://schemas.openxmlformats.org/drawingml/2006/main" xmlns:r="http://schemas.openxmlformats.org/officeDocument/2006/relationships" xmlns:p="http://schemas.openxmlformats.org/presentationml/2006/main">
+  <p:cSld>
+    <p:spTree>
+      <p:nvGrpSpPr>
+        <p:cNvPr id="1" name=""/>
+        <p:cNvGrpSpPr/>
+        <p:nvPr/>
+      </p:nvGrpSpPr>
+      <p:grpSpPr>
+        <a:xfrm>
+          <a:off x="0" y="0"/>
+          <a:ext cx="0" cy="0"/>
+          <a:chOff x="0" y="0"/>
+          <a:chExt cx="0" cy="0"/>
+        </a:xfrm>
+      </p:grpSpPr>
+      <p:pic>
+        <p:nvPicPr>
+          <p:cNvPr id="2" name="Picture 1"/>
+          <p:cNvPicPr>
+            <a:picLocks noChangeAspect="1"/>
+          </p:cNvPicPr>
+          <p:nvPr/>
+        </p:nvPicPr>
+        <p:blipFill>
+          <a:blip r:embed="rId2"/>
+          <a:stretch>
+            <a:fillRect/>
+          </a:stretch>
+        </p:blipFill>
+        <p:spPr>
+          <a:xfrm>
+            <a:off x="3106831" y="100854"/>
+            <a:ext cx="5467350" cy="2057400"/>
+          </a:xfrm>
+          <a:prstGeom prst="rect">
+            <a:avLst/>
+          </a:prstGeom>
+        </p:spPr>
+      </p:pic>
+      <p:pic>
+        <p:nvPicPr>
+          <p:cNvPr id="3" name="Picture 2"/>
+          <p:cNvPicPr>
+            <a:picLocks noChangeAspect="1"/>
+          </p:cNvPicPr>
+          <p:nvPr/>
+        </p:nvPicPr>
+        <p:blipFill>
+          <a:blip r:embed="rId3"/>
+          <a:stretch>
+            <a:fillRect/>
+          </a:stretch>
+        </p:blipFill>
+        <p:spPr>
+          <a:xfrm>
+            <a:off x="0" y="3666564"/>
+            <a:ext cx="4105275" cy="2590800"/>
+          </a:xfrm>
+          <a:prstGeom prst="rect">
+            <a:avLst/>
+          </a:prstGeom>
+        </p:spPr>
+      </p:pic>
+      <p:pic>
+        <p:nvPicPr>
+          <p:cNvPr id="4" name="Picture 3"/>
+          <p:cNvPicPr>
+            <a:picLocks noChangeAspect="1"/>
+          </p:cNvPicPr>
+          <p:nvPr/>
+        </p:nvPicPr>
+        <p:blipFill>
+          <a:blip r:embed="rId4"/>
+          <a:stretch>
+            <a:fillRect/>
+          </a:stretch>
+        </p:blipFill>
+        <p:spPr>
+          <a:xfrm>
+            <a:off x="4176993" y="3123639"/>
+            <a:ext cx="3990975" cy="3133725"/>
+          </a:xfrm>
+          <a:prstGeom prst="rect">
+            <a:avLst/>
+          </a:prstGeom>
+        </p:spPr>
+      </p:pic>
+      <p:pic>
+        <p:nvPicPr>
+          <p:cNvPr id="5" name="Picture 4"/>
+          <p:cNvPicPr>
+            <a:picLocks noChangeAspect="1"/>
+          </p:cNvPicPr>
+          <p:nvPr/>
+        </p:nvPicPr>
+        <p:blipFill>
+          <a:blip r:embed="rId5"/>
+          <a:stretch>
+            <a:fillRect/>
+          </a:stretch>
+        </p:blipFill>
+        <p:spPr>
+          <a:xfrm>
+            <a:off x="8258175" y="4104714"/>
+            <a:ext cx="3933825" cy="2152650"/>
+          </a:xfrm>
+          <a:prstGeom prst="rect">
+            <a:avLst/>
+          </a:prstGeom>
+        </p:spPr>
+      </p:pic>
+      <p:cxnSp>
+        <p:nvCxnSpPr>
+          <p:cNvPr id="7" name="Straight Arrow Connector 6"/>
+          <p:cNvCxnSpPr/>
+          <p:nvPr/>
+        </p:nvCxnSpPr>
+        <p:spPr>
+          <a:xfrm>
+            <a:off x="5840506" y="2286000"/>
+            <a:ext cx="0" cy="618565"/>
+          </a:xfrm>
+          <a:prstGeom prst="straightConnector1">
+            <a:avLst/>
+          </a:prstGeom>
+          <a:ln>
+            <a:tailEnd type="triangle"/>
+          </a:ln>
+        </p:spPr>
+        <p:style>
+          <a:lnRef idx="1">
+            <a:schemeClr val="accent1"/>
+          </a:lnRef>
+          <a:fillRef idx="0">
+            <a:schemeClr val="accent1"/>
+          </a:fillRef>
+          <a:effectRef idx="0">
+            <a:schemeClr val="accent1"/>
+          </a:effectRef>
+          <a:fontRef idx="minor">
+            <a:schemeClr val="tx1"/>
+          </a:fontRef>
+        </p:style>
+      </p:cxnSp>
+      <p:cxnSp>
+        <p:nvCxnSpPr>
+          <p:cNvPr id="9" name="Straight Arrow Connector 8"/>
+          <p:cNvCxnSpPr/>
+          <p:nvPr/>
+        </p:nvCxnSpPr>
+        <p:spPr>
+          <a:xfrm flipH="1">
+            <a:off x="2729753" y="2158254"/>
+            <a:ext cx="1613647" cy="1257299"/>
+          </a:xfrm>
+          <a:prstGeom prst="straightConnector1">
+            <a:avLst/>
+          </a:prstGeom>
+          <a:ln>
+            <a:tailEnd type="triangle"/>
+          </a:ln>
+        </p:spPr>
+        <p:style>
+          <a:lnRef idx="1">
+            <a:schemeClr val="accent1"/>
+          </a:lnRef>
+          <a:fillRef idx="0">
+            <a:schemeClr val="accent1"/>
+          </a:fillRef>
+          <a:effectRef idx="0">
+            <a:schemeClr val="accent1"/>
+          </a:effectRef>
+          <a:fontRef idx="minor">
+            <a:schemeClr val="tx1"/>
+          </a:fontRef>
+        </p:style>
+      </p:cxnSp>
+      <p:cxnSp>
+        <p:nvCxnSpPr>
+          <p:cNvPr id="11" name="Straight Arrow Connector 10"/>
+          <p:cNvCxnSpPr/>
+          <p:nvPr/>
+        </p:nvCxnSpPr>
+        <p:spPr>
+          <a:xfrm>
+            <a:off x="6992471" y="2158254"/>
+            <a:ext cx="2864223" cy="1620370"/>
+          </a:xfrm>
+          <a:prstGeom prst="straightConnector1">
+            <a:avLst/>
+          </a:prstGeom>
+          <a:ln>
+            <a:tailEnd type="triangle"/>
+          </a:ln>
+        </p:spPr>
+        <p:style>
+          <a:lnRef idx="1">
+            <a:schemeClr val="accent1"/>
+          </a:lnRef>
+          <a:fillRef idx="0">
+            <a:schemeClr val="accent1"/>
+          </a:fillRef>
+          <a:effectRef idx="0">
+            <a:schemeClr val="accent1"/>
+          </a:effectRef>
+          <a:fontRef idx="minor">
+            <a:schemeClr val="tx1"/>
+          </a:fontRef>
+        </p:style>
+      </p:cxnSp>
+    </p:spTree>
+    <p:extLst>
+      <p:ext uri="{BB962C8B-B14F-4D97-AF65-F5344CB8AC3E}">
+        <p14:creationId xmlns:p14="http://schemas.microsoft.com/office/powerpoint/2010/main" val="2785508655"/>
+      </p:ext>
+    </p:extLst>
+  </p:cSld>
+  <p:clrMapOvr>
+    <a:masterClrMapping/>
+  </p:clrMapOvr>
+</p:sld>
+</file>
+
+<file path=ppt/slides/slide23.xml><?xml version="1.0" encoding="utf-8"?>
+<p:sld xmlns:a="http://schemas.openxmlformats.org/drawingml/2006/main" xmlns:r="http://schemas.openxmlformats.org/officeDocument/2006/relationships" xmlns:p="http://schemas.openxmlformats.org/presentationml/2006/main">
+  <p:cSld>
+    <p:spTree>
+      <p:nvGrpSpPr>
+        <p:cNvPr id="1" name=""/>
+        <p:cNvGrpSpPr/>
+        <p:nvPr/>
+      </p:nvGrpSpPr>
+      <p:grpSpPr>
+        <a:xfrm>
+          <a:off x="0" y="0"/>
+          <a:ext cx="0" cy="0"/>
+          <a:chOff x="0" y="0"/>
+          <a:chExt cx="0" cy="0"/>
+        </a:xfrm>
+      </p:grpSpPr>
+      <p:pic>
+        <p:nvPicPr>
+          <p:cNvPr id="2" name="Picture 1"/>
+          <p:cNvPicPr>
+            <a:picLocks noChangeAspect="1"/>
+          </p:cNvPicPr>
+          <p:nvPr/>
+        </p:nvPicPr>
+        <p:blipFill>
+          <a:blip r:embed="rId2"/>
+          <a:stretch>
+            <a:fillRect/>
+          </a:stretch>
+        </p:blipFill>
+        <p:spPr>
+          <a:xfrm>
+            <a:off x="2535331" y="147076"/>
+            <a:ext cx="6153150" cy="3686175"/>
+          </a:xfrm>
+          <a:prstGeom prst="rect">
+            <a:avLst/>
+          </a:prstGeom>
+        </p:spPr>
+      </p:pic>
+      <p:pic>
+        <p:nvPicPr>
+          <p:cNvPr id="3" name="Picture 2"/>
+          <p:cNvPicPr>
+            <a:picLocks noChangeAspect="1"/>
+          </p:cNvPicPr>
+          <p:nvPr/>
+        </p:nvPicPr>
+        <p:blipFill>
+          <a:blip r:embed="rId3"/>
+          <a:stretch>
+            <a:fillRect/>
+          </a:stretch>
+        </p:blipFill>
+        <p:spPr>
+          <a:xfrm>
+            <a:off x="3804537" y="4313144"/>
+            <a:ext cx="3614738" cy="1885950"/>
+          </a:xfrm>
+          <a:prstGeom prst="rect">
+            <a:avLst/>
+          </a:prstGeom>
+        </p:spPr>
+      </p:pic>
+      <p:sp>
+        <p:nvSpPr>
+          <p:cNvPr id="4" name="Down Arrow 3"/>
+          <p:cNvSpPr/>
+          <p:nvPr/>
+        </p:nvSpPr>
+        <p:spPr>
+          <a:xfrm>
+            <a:off x="5459506" y="3833251"/>
+            <a:ext cx="152400" cy="429467"/>
+          </a:xfrm>
+          <a:prstGeom prst="downArrow">
+            <a:avLst/>
+          </a:prstGeom>
+        </p:spPr>
+        <p:style>
+          <a:lnRef idx="2">
+            <a:schemeClr val="accent1">
+              <a:shade val="50000"/>
+            </a:schemeClr>
+          </a:lnRef>
+          <a:fillRef idx="1">
+            <a:schemeClr val="accent1"/>
+          </a:fillRef>
+          <a:effectRef idx="0">
+            <a:schemeClr val="accent1"/>
+          </a:effectRef>
+          <a:fontRef idx="minor">
+            <a:schemeClr val="lt1"/>
+          </a:fontRef>
+        </p:style>
+        <p:txBody>
+          <a:bodyPr rtlCol="0" anchor="ctr"/>
+          <a:lstStyle/>
+          <a:p>
+            <a:pPr algn="ctr"/>
+            <a:endParaRPr lang="en-US"/>
+          </a:p>
+        </p:txBody>
+      </p:sp>
+    </p:spTree>
+    <p:extLst>
+      <p:ext uri="{BB962C8B-B14F-4D97-AF65-F5344CB8AC3E}">
+        <p14:creationId xmlns:p14="http://schemas.microsoft.com/office/powerpoint/2010/main" val="3661912595"/>
       </p:ext>
     </p:extLst>
   </p:cSld>

</xml_diff>